<commit_message>
updating slide deck powerpoint
updated slides for bitmaps
</commit_message>
<xml_diff>
--- a/Experiments/OLED_Screen/doc/screen_deck.pptx
+++ b/Experiments/OLED_Screen/doc/screen_deck.pptx
@@ -15,11 +15,14 @@
     <p:sldId id="270" r:id="rId9"/>
     <p:sldId id="269" r:id="rId10"/>
     <p:sldId id="268" r:id="rId11"/>
-    <p:sldId id="263" r:id="rId12"/>
-    <p:sldId id="267" r:id="rId13"/>
-    <p:sldId id="266" r:id="rId14"/>
-    <p:sldId id="261" r:id="rId15"/>
-    <p:sldId id="265" r:id="rId16"/>
+    <p:sldId id="278" r:id="rId12"/>
+    <p:sldId id="277" r:id="rId13"/>
+    <p:sldId id="276" r:id="rId14"/>
+    <p:sldId id="281" r:id="rId15"/>
+    <p:sldId id="263" r:id="rId16"/>
+    <p:sldId id="280" r:id="rId17"/>
+    <p:sldId id="279" r:id="rId18"/>
+    <p:sldId id="267" r:id="rId19"/>
   </p:sldIdLst>
   <p:sldSz cx="12192000" cy="6858000"/>
   <p:notesSz cx="6858000" cy="9144000"/>
@@ -273,7 +276,7 @@
           <a:p>
             <a:fld id="{477E4798-8B83-41D6-B8E2-2E5E8090BEC2}" type="datetimeFigureOut">
               <a:rPr lang="en-US" smtClean="0"/>
-              <a:t>5/5/2020</a:t>
+              <a:t>5/6/2020</a:t>
             </a:fld>
             <a:endParaRPr lang="en-US"/>
           </a:p>
@@ -471,7 +474,7 @@
           <a:p>
             <a:fld id="{477E4798-8B83-41D6-B8E2-2E5E8090BEC2}" type="datetimeFigureOut">
               <a:rPr lang="en-US" smtClean="0"/>
-              <a:t>5/5/2020</a:t>
+              <a:t>5/6/2020</a:t>
             </a:fld>
             <a:endParaRPr lang="en-US"/>
           </a:p>
@@ -679,7 +682,7 @@
           <a:p>
             <a:fld id="{477E4798-8B83-41D6-B8E2-2E5E8090BEC2}" type="datetimeFigureOut">
               <a:rPr lang="en-US" smtClean="0"/>
-              <a:t>5/5/2020</a:t>
+              <a:t>5/6/2020</a:t>
             </a:fld>
             <a:endParaRPr lang="en-US"/>
           </a:p>
@@ -877,7 +880,7 @@
           <a:p>
             <a:fld id="{477E4798-8B83-41D6-B8E2-2E5E8090BEC2}" type="datetimeFigureOut">
               <a:rPr lang="en-US" smtClean="0"/>
-              <a:t>5/5/2020</a:t>
+              <a:t>5/6/2020</a:t>
             </a:fld>
             <a:endParaRPr lang="en-US"/>
           </a:p>
@@ -1152,7 +1155,7 @@
           <a:p>
             <a:fld id="{477E4798-8B83-41D6-B8E2-2E5E8090BEC2}" type="datetimeFigureOut">
               <a:rPr lang="en-US" smtClean="0"/>
-              <a:t>5/5/2020</a:t>
+              <a:t>5/6/2020</a:t>
             </a:fld>
             <a:endParaRPr lang="en-US"/>
           </a:p>
@@ -1417,7 +1420,7 @@
           <a:p>
             <a:fld id="{477E4798-8B83-41D6-B8E2-2E5E8090BEC2}" type="datetimeFigureOut">
               <a:rPr lang="en-US" smtClean="0"/>
-              <a:t>5/5/2020</a:t>
+              <a:t>5/6/2020</a:t>
             </a:fld>
             <a:endParaRPr lang="en-US"/>
           </a:p>
@@ -1829,7 +1832,7 @@
           <a:p>
             <a:fld id="{477E4798-8B83-41D6-B8E2-2E5E8090BEC2}" type="datetimeFigureOut">
               <a:rPr lang="en-US" smtClean="0"/>
-              <a:t>5/5/2020</a:t>
+              <a:t>5/6/2020</a:t>
             </a:fld>
             <a:endParaRPr lang="en-US"/>
           </a:p>
@@ -1970,7 +1973,7 @@
           <a:p>
             <a:fld id="{477E4798-8B83-41D6-B8E2-2E5E8090BEC2}" type="datetimeFigureOut">
               <a:rPr lang="en-US" smtClean="0"/>
-              <a:t>5/5/2020</a:t>
+              <a:t>5/6/2020</a:t>
             </a:fld>
             <a:endParaRPr lang="en-US"/>
           </a:p>
@@ -2083,7 +2086,7 @@
           <a:p>
             <a:fld id="{477E4798-8B83-41D6-B8E2-2E5E8090BEC2}" type="datetimeFigureOut">
               <a:rPr lang="en-US" smtClean="0"/>
-              <a:t>5/5/2020</a:t>
+              <a:t>5/6/2020</a:t>
             </a:fld>
             <a:endParaRPr lang="en-US"/>
           </a:p>
@@ -2394,7 +2397,7 @@
           <a:p>
             <a:fld id="{477E4798-8B83-41D6-B8E2-2E5E8090BEC2}" type="datetimeFigureOut">
               <a:rPr lang="en-US" smtClean="0"/>
-              <a:t>5/5/2020</a:t>
+              <a:t>5/6/2020</a:t>
             </a:fld>
             <a:endParaRPr lang="en-US"/>
           </a:p>
@@ -2682,7 +2685,7 @@
           <a:p>
             <a:fld id="{477E4798-8B83-41D6-B8E2-2E5E8090BEC2}" type="datetimeFigureOut">
               <a:rPr lang="en-US" smtClean="0"/>
-              <a:t>5/5/2020</a:t>
+              <a:t>5/6/2020</a:t>
             </a:fld>
             <a:endParaRPr lang="en-US"/>
           </a:p>
@@ -2923,7 +2926,7 @@
           <a:p>
             <a:fld id="{477E4798-8B83-41D6-B8E2-2E5E8090BEC2}" type="datetimeFigureOut">
               <a:rPr lang="en-US" smtClean="0"/>
-              <a:t>5/5/2020</a:t>
+              <a:t>5/6/2020</a:t>
             </a:fld>
             <a:endParaRPr lang="en-US"/>
           </a:p>
@@ -3432,6 +3435,84 @@
           <a:chExt cx="0" cy="0"/>
         </a:xfrm>
       </p:grpSpPr>
+      <p:pic>
+        <p:nvPicPr>
+          <p:cNvPr id="10" name="Graphic 9" descr="Carrot Down">
+            <a:extLst>
+              <a:ext uri="{FF2B5EF4-FFF2-40B4-BE49-F238E27FC236}">
+                <a16:creationId xmlns:a16="http://schemas.microsoft.com/office/drawing/2014/main" id="{C64064C4-73D0-4DE7-B6CD-B8A8D8763F19}"/>
+              </a:ext>
+            </a:extLst>
+          </p:cNvPr>
+          <p:cNvPicPr>
+            <a:picLocks noChangeAspect="1"/>
+          </p:cNvPicPr>
+          <p:nvPr/>
+        </p:nvPicPr>
+        <p:blipFill>
+          <a:blip r:embed="rId2">
+            <a:extLst>
+              <a:ext uri="{28A0092B-C50C-407E-A947-70E740481C1C}">
+                <a14:useLocalDpi xmlns:a14="http://schemas.microsoft.com/office/drawing/2010/main" val="0"/>
+              </a:ext>
+              <a:ext uri="{96DAC541-7B7A-43D3-8B79-37D633B846F1}">
+                <asvg:svgBlip xmlns:asvg="http://schemas.microsoft.com/office/drawing/2016/SVG/main" r:embed="rId3"/>
+              </a:ext>
+            </a:extLst>
+          </a:blip>
+          <a:stretch>
+            <a:fillRect/>
+          </a:stretch>
+        </p:blipFill>
+        <p:spPr>
+          <a:xfrm>
+            <a:off x="6981155" y="2064370"/>
+            <a:ext cx="4311140" cy="3427526"/>
+          </a:xfrm>
+          <a:prstGeom prst="rect">
+            <a:avLst/>
+          </a:prstGeom>
+        </p:spPr>
+      </p:pic>
+      <p:pic>
+        <p:nvPicPr>
+          <p:cNvPr id="6" name="Graphic 5" descr="Carrot Down">
+            <a:extLst>
+              <a:ext uri="{FF2B5EF4-FFF2-40B4-BE49-F238E27FC236}">
+                <a16:creationId xmlns:a16="http://schemas.microsoft.com/office/drawing/2014/main" id="{F92B590E-B42D-411A-AE79-B35472DF09BF}"/>
+              </a:ext>
+            </a:extLst>
+          </p:cNvPr>
+          <p:cNvPicPr>
+            <a:picLocks noChangeAspect="1"/>
+          </p:cNvPicPr>
+          <p:nvPr/>
+        </p:nvPicPr>
+        <p:blipFill>
+          <a:blip r:embed="rId2">
+            <a:extLst>
+              <a:ext uri="{28A0092B-C50C-407E-A947-70E740481C1C}">
+                <a14:useLocalDpi xmlns:a14="http://schemas.microsoft.com/office/drawing/2010/main" val="0"/>
+              </a:ext>
+              <a:ext uri="{96DAC541-7B7A-43D3-8B79-37D633B846F1}">
+                <asvg:svgBlip xmlns:asvg="http://schemas.microsoft.com/office/drawing/2016/SVG/main" r:embed="rId3"/>
+              </a:ext>
+            </a:extLst>
+          </a:blip>
+          <a:stretch>
+            <a:fillRect/>
+          </a:stretch>
+        </p:blipFill>
+        <p:spPr>
+          <a:xfrm>
+            <a:off x="899707" y="1906429"/>
+            <a:ext cx="4311140" cy="3427526"/>
+          </a:xfrm>
+          <a:prstGeom prst="rect">
+            <a:avLst/>
+          </a:prstGeom>
+        </p:spPr>
+      </p:pic>
       <p:sp>
         <p:nvSpPr>
           <p:cNvPr id="11" name="Oval 10">
@@ -3548,162 +3629,6 @@
           </a:p>
         </p:txBody>
       </p:sp>
-      <p:cxnSp>
-        <p:nvCxnSpPr>
-          <p:cNvPr id="3" name="Straight Connector 2">
-            <a:extLst>
-              <a:ext uri="{FF2B5EF4-FFF2-40B4-BE49-F238E27FC236}">
-                <a16:creationId xmlns:a16="http://schemas.microsoft.com/office/drawing/2014/main" id="{77F6FEE9-8709-4F83-97E6-DA5E743E3839}"/>
-              </a:ext>
-            </a:extLst>
-          </p:cNvPr>
-          <p:cNvCxnSpPr>
-            <a:stCxn id="11" idx="2"/>
-            <a:endCxn id="11" idx="6"/>
-          </p:cNvCxnSpPr>
-          <p:nvPr/>
-        </p:nvCxnSpPr>
-        <p:spPr>
-          <a:xfrm>
-            <a:off x="789925" y="3429000"/>
-            <a:ext cx="4530705" cy="0"/>
-          </a:xfrm>
-          <a:prstGeom prst="line">
-            <a:avLst/>
-          </a:prstGeom>
-        </p:spPr>
-        <p:style>
-          <a:lnRef idx="1">
-            <a:schemeClr val="dk1"/>
-          </a:lnRef>
-          <a:fillRef idx="0">
-            <a:schemeClr val="dk1"/>
-          </a:fillRef>
-          <a:effectRef idx="0">
-            <a:schemeClr val="dk1"/>
-          </a:effectRef>
-          <a:fontRef idx="minor">
-            <a:schemeClr val="tx1"/>
-          </a:fontRef>
-        </p:style>
-      </p:cxnSp>
-      <p:cxnSp>
-        <p:nvCxnSpPr>
-          <p:cNvPr id="8" name="Straight Connector 7">
-            <a:extLst>
-              <a:ext uri="{FF2B5EF4-FFF2-40B4-BE49-F238E27FC236}">
-                <a16:creationId xmlns:a16="http://schemas.microsoft.com/office/drawing/2014/main" id="{1AD34377-88BC-4998-AF8B-CA3E8ECDB752}"/>
-              </a:ext>
-            </a:extLst>
-          </p:cNvPr>
-          <p:cNvCxnSpPr>
-            <a:stCxn id="13" idx="2"/>
-            <a:endCxn id="13" idx="6"/>
-          </p:cNvCxnSpPr>
-          <p:nvPr/>
-        </p:nvCxnSpPr>
-        <p:spPr>
-          <a:xfrm>
-            <a:off x="6871370" y="3429000"/>
-            <a:ext cx="4530705" cy="0"/>
-          </a:xfrm>
-          <a:prstGeom prst="line">
-            <a:avLst/>
-          </a:prstGeom>
-        </p:spPr>
-        <p:style>
-          <a:lnRef idx="1">
-            <a:schemeClr val="dk1"/>
-          </a:lnRef>
-          <a:fillRef idx="0">
-            <a:schemeClr val="dk1"/>
-          </a:fillRef>
-          <a:effectRef idx="0">
-            <a:schemeClr val="dk1"/>
-          </a:effectRef>
-          <a:fontRef idx="minor">
-            <a:schemeClr val="tx1"/>
-          </a:fontRef>
-        </p:style>
-      </p:cxnSp>
-      <p:pic>
-        <p:nvPicPr>
-          <p:cNvPr id="6" name="Graphic 5" descr="Carrot Down">
-            <a:extLst>
-              <a:ext uri="{FF2B5EF4-FFF2-40B4-BE49-F238E27FC236}">
-                <a16:creationId xmlns:a16="http://schemas.microsoft.com/office/drawing/2014/main" id="{F92B590E-B42D-411A-AE79-B35472DF09BF}"/>
-              </a:ext>
-            </a:extLst>
-          </p:cNvPr>
-          <p:cNvPicPr>
-            <a:picLocks noChangeAspect="1"/>
-          </p:cNvPicPr>
-          <p:nvPr/>
-        </p:nvPicPr>
-        <p:blipFill>
-          <a:blip r:embed="rId2">
-            <a:extLst>
-              <a:ext uri="{28A0092B-C50C-407E-A947-70E740481C1C}">
-                <a14:useLocalDpi xmlns:a14="http://schemas.microsoft.com/office/drawing/2010/main" val="0"/>
-              </a:ext>
-              <a:ext uri="{96DAC541-7B7A-43D3-8B79-37D633B846F1}">
-                <asvg:svgBlip xmlns:asvg="http://schemas.microsoft.com/office/drawing/2016/SVG/main" r:embed="rId3"/>
-              </a:ext>
-            </a:extLst>
-          </a:blip>
-          <a:stretch>
-            <a:fillRect/>
-          </a:stretch>
-        </p:blipFill>
-        <p:spPr>
-          <a:xfrm>
-            <a:off x="899707" y="1906429"/>
-            <a:ext cx="4311140" cy="3427526"/>
-          </a:xfrm>
-          <a:prstGeom prst="rect">
-            <a:avLst/>
-          </a:prstGeom>
-        </p:spPr>
-      </p:pic>
-      <p:pic>
-        <p:nvPicPr>
-          <p:cNvPr id="10" name="Graphic 9" descr="Carrot Down">
-            <a:extLst>
-              <a:ext uri="{FF2B5EF4-FFF2-40B4-BE49-F238E27FC236}">
-                <a16:creationId xmlns:a16="http://schemas.microsoft.com/office/drawing/2014/main" id="{C64064C4-73D0-4DE7-B6CD-B8A8D8763F19}"/>
-              </a:ext>
-            </a:extLst>
-          </p:cNvPr>
-          <p:cNvPicPr>
-            <a:picLocks noChangeAspect="1"/>
-          </p:cNvPicPr>
-          <p:nvPr/>
-        </p:nvPicPr>
-        <p:blipFill>
-          <a:blip r:embed="rId2">
-            <a:extLst>
-              <a:ext uri="{28A0092B-C50C-407E-A947-70E740481C1C}">
-                <a14:useLocalDpi xmlns:a14="http://schemas.microsoft.com/office/drawing/2010/main" val="0"/>
-              </a:ext>
-              <a:ext uri="{96DAC541-7B7A-43D3-8B79-37D633B846F1}">
-                <asvg:svgBlip xmlns:asvg="http://schemas.microsoft.com/office/drawing/2016/SVG/main" r:embed="rId3"/>
-              </a:ext>
-            </a:extLst>
-          </a:blip>
-          <a:stretch>
-            <a:fillRect/>
-          </a:stretch>
-        </p:blipFill>
-        <p:spPr>
-          <a:xfrm>
-            <a:off x="6981155" y="2064370"/>
-            <a:ext cx="4311140" cy="3427526"/>
-          </a:xfrm>
-          <a:prstGeom prst="rect">
-            <a:avLst/>
-          </a:prstGeom>
-        </p:spPr>
-      </p:pic>
     </p:spTree>
     <p:extLst>
       <p:ext uri="{BB962C8B-B14F-4D97-AF65-F5344CB8AC3E}">
@@ -3734,90 +3659,253 @@
           <a:chExt cx="0" cy="0"/>
         </a:xfrm>
       </p:grpSpPr>
-      <p:pic>
-        <p:nvPicPr>
-          <p:cNvPr id="4" name="Content Placeholder 3" descr="Badge Tick1">
-            <a:extLst>
-              <a:ext uri="{FF2B5EF4-FFF2-40B4-BE49-F238E27FC236}">
-                <a16:creationId xmlns:a16="http://schemas.microsoft.com/office/drawing/2014/main" id="{CD198D05-F054-44E6-9DB1-83C86921A8BD}"/>
-              </a:ext>
-            </a:extLst>
-          </p:cNvPr>
-          <p:cNvPicPr>
-            <a:picLocks noGrp="1" noChangeAspect="1"/>
-          </p:cNvPicPr>
-          <p:nvPr>
-            <p:ph idx="1"/>
-          </p:nvPr>
-        </p:nvPicPr>
-        <p:blipFill>
-          <a:blip r:embed="rId2">
-            <a:extLst>
-              <a:ext uri="{28A0092B-C50C-407E-A947-70E740481C1C}">
-                <a14:useLocalDpi xmlns:a14="http://schemas.microsoft.com/office/drawing/2010/main" val="0"/>
-              </a:ext>
-              <a:ext uri="{96DAC541-7B7A-43D3-8B79-37D633B846F1}">
-                <asvg:svgBlip xmlns:asvg="http://schemas.microsoft.com/office/drawing/2016/SVG/main" r:embed="rId3"/>
-              </a:ext>
-            </a:extLst>
-          </a:blip>
-          <a:stretch>
-            <a:fillRect/>
-          </a:stretch>
-        </p:blipFill>
-        <p:spPr>
-          <a:xfrm>
-            <a:off x="6248400" y="1835576"/>
-            <a:ext cx="3596640" cy="2712720"/>
+      <p:sp>
+        <p:nvSpPr>
+          <p:cNvPr id="11" name="Oval 10">
+            <a:extLst>
+              <a:ext uri="{FF2B5EF4-FFF2-40B4-BE49-F238E27FC236}">
+                <a16:creationId xmlns:a16="http://schemas.microsoft.com/office/drawing/2014/main" id="{80FA8DB1-DA72-4F1C-9F56-F46DC83C584D}"/>
+              </a:ext>
+            </a:extLst>
+          </p:cNvPr>
+          <p:cNvSpPr/>
+          <p:nvPr/>
+        </p:nvSpPr>
+        <p:spPr>
+          <a:xfrm>
+            <a:off x="789925" y="1715237"/>
+            <a:ext cx="4530705" cy="3427526"/>
+          </a:xfrm>
+          <a:prstGeom prst="ellipse">
+            <a:avLst/>
+          </a:prstGeom>
+          <a:solidFill>
+            <a:schemeClr val="bg1">
+              <a:alpha val="39000"/>
+            </a:schemeClr>
+          </a:solidFill>
+          <a:ln w="190500"/>
+        </p:spPr>
+        <p:style>
+          <a:lnRef idx="2">
+            <a:schemeClr val="dk1">
+              <a:shade val="50000"/>
+            </a:schemeClr>
+          </a:lnRef>
+          <a:fillRef idx="1">
+            <a:schemeClr val="dk1"/>
+          </a:fillRef>
+          <a:effectRef idx="0">
+            <a:schemeClr val="dk1"/>
+          </a:effectRef>
+          <a:fontRef idx="minor">
+            <a:schemeClr val="lt1"/>
+          </a:fontRef>
+        </p:style>
+        <p:txBody>
+          <a:bodyPr rtlCol="0" anchor="ctr"/>
+          <a:lstStyle/>
+          <a:p>
+            <a:pPr algn="ctr"/>
+            <a:endParaRPr lang="en-US">
+              <a:ln w="6350">
+                <a:solidFill>
+                  <a:schemeClr val="tx1"/>
+                </a:solidFill>
+              </a:ln>
+            </a:endParaRPr>
+          </a:p>
+        </p:txBody>
+      </p:sp>
+      <p:sp>
+        <p:nvSpPr>
+          <p:cNvPr id="13" name="Oval 12">
+            <a:extLst>
+              <a:ext uri="{FF2B5EF4-FFF2-40B4-BE49-F238E27FC236}">
+                <a16:creationId xmlns:a16="http://schemas.microsoft.com/office/drawing/2014/main" id="{00895A0D-7E36-4F02-A6BE-5AB1EAD3F88A}"/>
+              </a:ext>
+            </a:extLst>
+          </p:cNvPr>
+          <p:cNvSpPr/>
+          <p:nvPr/>
+        </p:nvSpPr>
+        <p:spPr>
+          <a:xfrm>
+            <a:off x="6871370" y="1715237"/>
+            <a:ext cx="4530705" cy="3427526"/>
+          </a:xfrm>
+          <a:prstGeom prst="ellipse">
+            <a:avLst/>
+          </a:prstGeom>
+          <a:solidFill>
+            <a:schemeClr val="bg1">
+              <a:alpha val="39000"/>
+            </a:schemeClr>
+          </a:solidFill>
+          <a:ln w="190500"/>
+        </p:spPr>
+        <p:style>
+          <a:lnRef idx="2">
+            <a:schemeClr val="dk1">
+              <a:shade val="50000"/>
+            </a:schemeClr>
+          </a:lnRef>
+          <a:fillRef idx="1">
+            <a:schemeClr val="dk1"/>
+          </a:fillRef>
+          <a:effectRef idx="0">
+            <a:schemeClr val="dk1"/>
+          </a:effectRef>
+          <a:fontRef idx="minor">
+            <a:schemeClr val="lt1"/>
+          </a:fontRef>
+        </p:style>
+        <p:txBody>
+          <a:bodyPr rtlCol="0" anchor="ctr"/>
+          <a:lstStyle/>
+          <a:p>
+            <a:pPr algn="ctr"/>
+            <a:endParaRPr lang="en-US">
+              <a:ln w="6350">
+                <a:solidFill>
+                  <a:schemeClr val="tx1"/>
+                </a:solidFill>
+              </a:ln>
+            </a:endParaRPr>
+          </a:p>
+        </p:txBody>
+      </p:sp>
+      <p:cxnSp>
+        <p:nvCxnSpPr>
+          <p:cNvPr id="3" name="Straight Connector 2">
+            <a:extLst>
+              <a:ext uri="{FF2B5EF4-FFF2-40B4-BE49-F238E27FC236}">
+                <a16:creationId xmlns:a16="http://schemas.microsoft.com/office/drawing/2014/main" id="{77F6FEE9-8709-4F83-97E6-DA5E743E3839}"/>
+              </a:ext>
+            </a:extLst>
+          </p:cNvPr>
+          <p:cNvCxnSpPr>
+            <a:stCxn id="11" idx="2"/>
+            <a:endCxn id="11" idx="6"/>
+          </p:cNvCxnSpPr>
+          <p:nvPr/>
+        </p:nvCxnSpPr>
+        <p:spPr>
+          <a:xfrm>
+            <a:off x="789925" y="3429000"/>
+            <a:ext cx="4530705" cy="0"/>
+          </a:xfrm>
+          <a:prstGeom prst="line">
+            <a:avLst/>
+          </a:prstGeom>
+        </p:spPr>
+        <p:style>
+          <a:lnRef idx="1">
+            <a:schemeClr val="dk1"/>
+          </a:lnRef>
+          <a:fillRef idx="0">
+            <a:schemeClr val="dk1"/>
+          </a:fillRef>
+          <a:effectRef idx="0">
+            <a:schemeClr val="dk1"/>
+          </a:effectRef>
+          <a:fontRef idx="minor">
+            <a:schemeClr val="tx1"/>
+          </a:fontRef>
+        </p:style>
+      </p:cxnSp>
+      <p:cxnSp>
+        <p:nvCxnSpPr>
+          <p:cNvPr id="8" name="Straight Connector 7">
+            <a:extLst>
+              <a:ext uri="{FF2B5EF4-FFF2-40B4-BE49-F238E27FC236}">
+                <a16:creationId xmlns:a16="http://schemas.microsoft.com/office/drawing/2014/main" id="{1AD34377-88BC-4998-AF8B-CA3E8ECDB752}"/>
+              </a:ext>
+            </a:extLst>
+          </p:cNvPr>
+          <p:cNvCxnSpPr>
+            <a:stCxn id="13" idx="2"/>
+            <a:endCxn id="13" idx="6"/>
+          </p:cNvCxnSpPr>
+          <p:nvPr/>
+        </p:nvCxnSpPr>
+        <p:spPr>
+          <a:xfrm>
+            <a:off x="6871370" y="3429000"/>
+            <a:ext cx="4530705" cy="0"/>
+          </a:xfrm>
+          <a:prstGeom prst="line">
+            <a:avLst/>
+          </a:prstGeom>
+        </p:spPr>
+        <p:style>
+          <a:lnRef idx="1">
+            <a:schemeClr val="dk1"/>
+          </a:lnRef>
+          <a:fillRef idx="0">
+            <a:schemeClr val="dk1"/>
+          </a:fillRef>
+          <a:effectRef idx="0">
+            <a:schemeClr val="dk1"/>
+          </a:effectRef>
+          <a:fontRef idx="minor">
+            <a:schemeClr val="tx1"/>
+          </a:fontRef>
+        </p:style>
+      </p:cxnSp>
+      <p:sp>
+        <p:nvSpPr>
+          <p:cNvPr id="2" name="Rectangle 1">
+            <a:extLst>
+              <a:ext uri="{FF2B5EF4-FFF2-40B4-BE49-F238E27FC236}">
+                <a16:creationId xmlns:a16="http://schemas.microsoft.com/office/drawing/2014/main" id="{8E3F3849-3461-4C88-9406-7B2CF06E73A4}"/>
+              </a:ext>
+            </a:extLst>
+          </p:cNvPr>
+          <p:cNvSpPr/>
+          <p:nvPr/>
+        </p:nvSpPr>
+        <p:spPr>
+          <a:xfrm>
+            <a:off x="422388" y="3429000"/>
+            <a:ext cx="11330205" cy="2447289"/>
           </a:xfrm>
           <a:prstGeom prst="rect">
             <a:avLst/>
           </a:prstGeom>
-        </p:spPr>
-      </p:pic>
-      <p:pic>
-        <p:nvPicPr>
-          <p:cNvPr id="5" name="Graphic 4" descr="Badge Tick1">
-            <a:extLst>
-              <a:ext uri="{FF2B5EF4-FFF2-40B4-BE49-F238E27FC236}">
-                <a16:creationId xmlns:a16="http://schemas.microsoft.com/office/drawing/2014/main" id="{23068C95-9B89-496D-97B4-2DA0EC1AE179}"/>
-              </a:ext>
-            </a:extLst>
-          </p:cNvPr>
-          <p:cNvPicPr>
-            <a:picLocks noChangeAspect="1"/>
-          </p:cNvPicPr>
-          <p:nvPr/>
-        </p:nvPicPr>
-        <p:blipFill>
-          <a:blip r:embed="rId2">
-            <a:extLst>
-              <a:ext uri="{28A0092B-C50C-407E-A947-70E740481C1C}">
-                <a14:useLocalDpi xmlns:a14="http://schemas.microsoft.com/office/drawing/2010/main" val="0"/>
-              </a:ext>
-              <a:ext uri="{96DAC541-7B7A-43D3-8B79-37D633B846F1}">
-                <asvg:svgBlip xmlns:asvg="http://schemas.microsoft.com/office/drawing/2016/SVG/main" r:embed="rId3"/>
-              </a:ext>
-            </a:extLst>
-          </a:blip>
-          <a:stretch>
-            <a:fillRect/>
-          </a:stretch>
-        </p:blipFill>
-        <p:spPr>
-          <a:xfrm flipH="1">
-            <a:off x="1706880" y="1835576"/>
-            <a:ext cx="3093718" cy="2666426"/>
-          </a:xfrm>
-          <a:prstGeom prst="rect">
-            <a:avLst/>
-          </a:prstGeom>
-        </p:spPr>
-      </p:pic>
+          <a:ln>
+            <a:solidFill>
+              <a:schemeClr val="bg1"/>
+            </a:solidFill>
+          </a:ln>
+        </p:spPr>
+        <p:style>
+          <a:lnRef idx="2">
+            <a:schemeClr val="dk1"/>
+          </a:lnRef>
+          <a:fillRef idx="1">
+            <a:schemeClr val="lt1"/>
+          </a:fillRef>
+          <a:effectRef idx="0">
+            <a:schemeClr val="dk1"/>
+          </a:effectRef>
+          <a:fontRef idx="minor">
+            <a:schemeClr val="dk1"/>
+          </a:fontRef>
+        </p:style>
+        <p:txBody>
+          <a:bodyPr rtlCol="0" anchor="ctr"/>
+          <a:lstStyle/>
+          <a:p>
+            <a:pPr algn="ctr"/>
+            <a:endParaRPr lang="en-US"/>
+          </a:p>
+        </p:txBody>
+      </p:sp>
     </p:spTree>
     <p:extLst>
       <p:ext uri="{BB962C8B-B14F-4D97-AF65-F5344CB8AC3E}">
-        <p14:creationId xmlns:p14="http://schemas.microsoft.com/office/powerpoint/2010/main" val="1082207580"/>
+        <p14:creationId xmlns:p14="http://schemas.microsoft.com/office/powerpoint/2010/main" val="2372760446"/>
       </p:ext>
     </p:extLst>
   </p:cSld>
@@ -4038,10 +4126,59 @@
           </a:fontRef>
         </p:style>
       </p:cxnSp>
+      <p:sp>
+        <p:nvSpPr>
+          <p:cNvPr id="2" name="Rectangle 1">
+            <a:extLst>
+              <a:ext uri="{FF2B5EF4-FFF2-40B4-BE49-F238E27FC236}">
+                <a16:creationId xmlns:a16="http://schemas.microsoft.com/office/drawing/2014/main" id="{576BAF13-0351-427F-BD90-1120F7FED27B}"/>
+              </a:ext>
+            </a:extLst>
+          </p:cNvPr>
+          <p:cNvSpPr/>
+          <p:nvPr/>
+        </p:nvSpPr>
+        <p:spPr>
+          <a:xfrm>
+            <a:off x="417746" y="1035105"/>
+            <a:ext cx="11390546" cy="2393895"/>
+          </a:xfrm>
+          <a:prstGeom prst="rect">
+            <a:avLst/>
+          </a:prstGeom>
+          <a:ln>
+            <a:solidFill>
+              <a:schemeClr val="bg1"/>
+            </a:solidFill>
+          </a:ln>
+        </p:spPr>
+        <p:style>
+          <a:lnRef idx="2">
+            <a:schemeClr val="dk1"/>
+          </a:lnRef>
+          <a:fillRef idx="1">
+            <a:schemeClr val="lt1"/>
+          </a:fillRef>
+          <a:effectRef idx="0">
+            <a:schemeClr val="dk1"/>
+          </a:effectRef>
+          <a:fontRef idx="minor">
+            <a:schemeClr val="dk1"/>
+          </a:fontRef>
+        </p:style>
+        <p:txBody>
+          <a:bodyPr rtlCol="0" anchor="ctr"/>
+          <a:lstStyle/>
+          <a:p>
+            <a:pPr algn="ctr"/>
+            <a:endParaRPr lang="en-US"/>
+          </a:p>
+        </p:txBody>
+      </p:sp>
     </p:spTree>
     <p:extLst>
       <p:ext uri="{BB962C8B-B14F-4D97-AF65-F5344CB8AC3E}">
-        <p14:creationId xmlns:p14="http://schemas.microsoft.com/office/powerpoint/2010/main" val="2189473913"/>
+        <p14:creationId xmlns:p14="http://schemas.microsoft.com/office/powerpoint/2010/main" val="3881018109"/>
       </p:ext>
     </p:extLst>
   </p:cSld>
@@ -4089,8 +4226,11 @@
             <a:avLst/>
           </a:prstGeom>
           <a:solidFill>
-            <a:schemeClr val="bg1"/>
+            <a:schemeClr val="bg1">
+              <a:alpha val="39000"/>
+            </a:schemeClr>
           </a:solidFill>
+          <a:ln w="190500"/>
         </p:spPr>
         <p:style>
           <a:lnRef idx="2">
@@ -4123,40 +4263,195 @@
           </a:p>
         </p:txBody>
       </p:sp>
-      <p:pic>
-        <p:nvPicPr>
-          <p:cNvPr id="12" name="Picture 11">
-            <a:extLst>
-              <a:ext uri="{FF2B5EF4-FFF2-40B4-BE49-F238E27FC236}">
-                <a16:creationId xmlns:a16="http://schemas.microsoft.com/office/drawing/2014/main" id="{AD65C418-69FA-41F9-B242-D05157B1B437}"/>
-              </a:ext>
-            </a:extLst>
-          </p:cNvPr>
-          <p:cNvPicPr>
-            <a:picLocks noChangeAspect="1"/>
-          </p:cNvPicPr>
+      <p:sp>
+        <p:nvSpPr>
+          <p:cNvPr id="13" name="Oval 12">
+            <a:extLst>
+              <a:ext uri="{FF2B5EF4-FFF2-40B4-BE49-F238E27FC236}">
+                <a16:creationId xmlns:a16="http://schemas.microsoft.com/office/drawing/2014/main" id="{00895A0D-7E36-4F02-A6BE-5AB1EAD3F88A}"/>
+              </a:ext>
+            </a:extLst>
+          </p:cNvPr>
+          <p:cNvSpPr/>
           <p:nvPr/>
-        </p:nvPicPr>
-        <p:blipFill>
-          <a:blip r:embed="rId2"/>
-          <a:stretch>
-            <a:fillRect/>
-          </a:stretch>
-        </p:blipFill>
-        <p:spPr>
-          <a:xfrm>
-            <a:off x="6871371" y="1698863"/>
-            <a:ext cx="4541914" cy="3438442"/>
+        </p:nvSpPr>
+        <p:spPr>
+          <a:xfrm>
+            <a:off x="6871370" y="1715237"/>
+            <a:ext cx="4530705" cy="3427526"/>
+          </a:xfrm>
+          <a:prstGeom prst="ellipse">
+            <a:avLst/>
+          </a:prstGeom>
+          <a:solidFill>
+            <a:schemeClr val="bg1">
+              <a:alpha val="39000"/>
+            </a:schemeClr>
+          </a:solidFill>
+          <a:ln w="190500"/>
+        </p:spPr>
+        <p:style>
+          <a:lnRef idx="2">
+            <a:schemeClr val="dk1">
+              <a:shade val="50000"/>
+            </a:schemeClr>
+          </a:lnRef>
+          <a:fillRef idx="1">
+            <a:schemeClr val="dk1"/>
+          </a:fillRef>
+          <a:effectRef idx="0">
+            <a:schemeClr val="dk1"/>
+          </a:effectRef>
+          <a:fontRef idx="minor">
+            <a:schemeClr val="lt1"/>
+          </a:fontRef>
+        </p:style>
+        <p:txBody>
+          <a:bodyPr rtlCol="0" anchor="ctr"/>
+          <a:lstStyle/>
+          <a:p>
+            <a:pPr algn="ctr"/>
+            <a:endParaRPr lang="en-US">
+              <a:ln w="6350">
+                <a:solidFill>
+                  <a:schemeClr val="tx1"/>
+                </a:solidFill>
+              </a:ln>
+            </a:endParaRPr>
+          </a:p>
+        </p:txBody>
+      </p:sp>
+      <p:cxnSp>
+        <p:nvCxnSpPr>
+          <p:cNvPr id="3" name="Straight Connector 2">
+            <a:extLst>
+              <a:ext uri="{FF2B5EF4-FFF2-40B4-BE49-F238E27FC236}">
+                <a16:creationId xmlns:a16="http://schemas.microsoft.com/office/drawing/2014/main" id="{77F6FEE9-8709-4F83-97E6-DA5E743E3839}"/>
+              </a:ext>
+            </a:extLst>
+          </p:cNvPr>
+          <p:cNvCxnSpPr>
+            <a:stCxn id="11" idx="2"/>
+            <a:endCxn id="11" idx="6"/>
+          </p:cNvCxnSpPr>
+          <p:nvPr/>
+        </p:nvCxnSpPr>
+        <p:spPr>
+          <a:xfrm>
+            <a:off x="789925" y="3429000"/>
+            <a:ext cx="4530705" cy="0"/>
+          </a:xfrm>
+          <a:prstGeom prst="line">
+            <a:avLst/>
+          </a:prstGeom>
+        </p:spPr>
+        <p:style>
+          <a:lnRef idx="1">
+            <a:schemeClr val="dk1"/>
+          </a:lnRef>
+          <a:fillRef idx="0">
+            <a:schemeClr val="dk1"/>
+          </a:fillRef>
+          <a:effectRef idx="0">
+            <a:schemeClr val="dk1"/>
+          </a:effectRef>
+          <a:fontRef idx="minor">
+            <a:schemeClr val="tx1"/>
+          </a:fontRef>
+        </p:style>
+      </p:cxnSp>
+      <p:cxnSp>
+        <p:nvCxnSpPr>
+          <p:cNvPr id="8" name="Straight Connector 7">
+            <a:extLst>
+              <a:ext uri="{FF2B5EF4-FFF2-40B4-BE49-F238E27FC236}">
+                <a16:creationId xmlns:a16="http://schemas.microsoft.com/office/drawing/2014/main" id="{1AD34377-88BC-4998-AF8B-CA3E8ECDB752}"/>
+              </a:ext>
+            </a:extLst>
+          </p:cNvPr>
+          <p:cNvCxnSpPr>
+            <a:stCxn id="13" idx="2"/>
+            <a:endCxn id="13" idx="6"/>
+          </p:cNvCxnSpPr>
+          <p:nvPr/>
+        </p:nvCxnSpPr>
+        <p:spPr>
+          <a:xfrm>
+            <a:off x="6871370" y="3429000"/>
+            <a:ext cx="4530705" cy="0"/>
+          </a:xfrm>
+          <a:prstGeom prst="line">
+            <a:avLst/>
+          </a:prstGeom>
+        </p:spPr>
+        <p:style>
+          <a:lnRef idx="1">
+            <a:schemeClr val="dk1"/>
+          </a:lnRef>
+          <a:fillRef idx="0">
+            <a:schemeClr val="dk1"/>
+          </a:fillRef>
+          <a:effectRef idx="0">
+            <a:schemeClr val="dk1"/>
+          </a:effectRef>
+          <a:fontRef idx="minor">
+            <a:schemeClr val="tx1"/>
+          </a:fontRef>
+        </p:style>
+      </p:cxnSp>
+      <p:sp>
+        <p:nvSpPr>
+          <p:cNvPr id="2" name="Rectangle 1">
+            <a:extLst>
+              <a:ext uri="{FF2B5EF4-FFF2-40B4-BE49-F238E27FC236}">
+                <a16:creationId xmlns:a16="http://schemas.microsoft.com/office/drawing/2014/main" id="{289DACCC-5304-42D1-8D13-70ACDB81926B}"/>
+              </a:ext>
+            </a:extLst>
+          </p:cNvPr>
+          <p:cNvSpPr/>
+          <p:nvPr/>
+        </p:nvSpPr>
+        <p:spPr>
+          <a:xfrm>
+            <a:off x="454879" y="3202721"/>
+            <a:ext cx="11167748" cy="459521"/>
           </a:xfrm>
           <a:prstGeom prst="rect">
             <a:avLst/>
           </a:prstGeom>
-        </p:spPr>
-      </p:pic>
+          <a:ln>
+            <a:solidFill>
+              <a:schemeClr val="bg1"/>
+            </a:solidFill>
+          </a:ln>
+        </p:spPr>
+        <p:style>
+          <a:lnRef idx="2">
+            <a:schemeClr val="dk1"/>
+          </a:lnRef>
+          <a:fillRef idx="1">
+            <a:schemeClr val="lt1"/>
+          </a:fillRef>
+          <a:effectRef idx="0">
+            <a:schemeClr val="dk1"/>
+          </a:effectRef>
+          <a:fontRef idx="minor">
+            <a:schemeClr val="dk1"/>
+          </a:fontRef>
+        </p:style>
+        <p:txBody>
+          <a:bodyPr rtlCol="0" anchor="ctr"/>
+          <a:lstStyle/>
+          <a:p>
+            <a:pPr algn="ctr"/>
+            <a:endParaRPr lang="en-US"/>
+          </a:p>
+        </p:txBody>
+      </p:sp>
     </p:spTree>
     <p:extLst>
       <p:ext uri="{BB962C8B-B14F-4D97-AF65-F5344CB8AC3E}">
-        <p14:creationId xmlns:p14="http://schemas.microsoft.com/office/powerpoint/2010/main" val="1729581056"/>
+        <p14:creationId xmlns:p14="http://schemas.microsoft.com/office/powerpoint/2010/main" val="3551600776"/>
       </p:ext>
     </p:extLst>
   </p:cSld>
@@ -4167,21 +4462,8 @@
 </file>
 
 <file path=ppt/slides/slide14.xml><?xml version="1.0" encoding="utf-8"?>
-<p:sld xmlns:a="http://schemas.openxmlformats.org/drawingml/2006/main" xmlns:r="http://schemas.openxmlformats.org/officeDocument/2006/relationships" xmlns:p="http://schemas.openxmlformats.org/presentationml/2006/main" showMasterSp="0">
+<p:sld xmlns:a="http://schemas.openxmlformats.org/drawingml/2006/main" xmlns:r="http://schemas.openxmlformats.org/officeDocument/2006/relationships" xmlns:p="http://schemas.openxmlformats.org/presentationml/2006/main">
   <p:cSld>
-    <p:bg>
-      <p:bgPr>
-        <a:pattFill prst="pct10">
-          <a:fgClr>
-            <a:schemeClr val="accent1"/>
-          </a:fgClr>
-          <a:bgClr>
-            <a:schemeClr val="bg1"/>
-          </a:bgClr>
-        </a:pattFill>
-        <a:effectLst/>
-      </p:bgPr>
-    </p:bg>
     <p:spTree>
       <p:nvGrpSpPr>
         <p:cNvPr id="1" name=""/>
@@ -4217,8 +4499,11 @@
             <a:avLst/>
           </a:prstGeom>
           <a:solidFill>
-            <a:schemeClr val="bg1"/>
+            <a:schemeClr val="bg1">
+              <a:alpha val="39000"/>
+            </a:schemeClr>
           </a:solidFill>
+          <a:ln w="190500"/>
         </p:spPr>
         <p:style>
           <a:lnRef idx="2">
@@ -4251,40 +4536,146 @@
           </a:p>
         </p:txBody>
       </p:sp>
-      <p:pic>
-        <p:nvPicPr>
-          <p:cNvPr id="12" name="Picture 11">
-            <a:extLst>
-              <a:ext uri="{FF2B5EF4-FFF2-40B4-BE49-F238E27FC236}">
-                <a16:creationId xmlns:a16="http://schemas.microsoft.com/office/drawing/2014/main" id="{AD65C418-69FA-41F9-B242-D05157B1B437}"/>
-              </a:ext>
-            </a:extLst>
-          </p:cNvPr>
-          <p:cNvPicPr>
-            <a:picLocks noChangeAspect="1"/>
-          </p:cNvPicPr>
+      <p:sp>
+        <p:nvSpPr>
+          <p:cNvPr id="13" name="Oval 12">
+            <a:extLst>
+              <a:ext uri="{FF2B5EF4-FFF2-40B4-BE49-F238E27FC236}">
+                <a16:creationId xmlns:a16="http://schemas.microsoft.com/office/drawing/2014/main" id="{00895A0D-7E36-4F02-A6BE-5AB1EAD3F88A}"/>
+              </a:ext>
+            </a:extLst>
+          </p:cNvPr>
+          <p:cNvSpPr/>
           <p:nvPr/>
-        </p:nvPicPr>
-        <p:blipFill>
-          <a:blip r:embed="rId2"/>
-          <a:stretch>
-            <a:fillRect/>
-          </a:stretch>
-        </p:blipFill>
-        <p:spPr>
-          <a:xfrm>
-            <a:off x="6871371" y="1698863"/>
-            <a:ext cx="4541914" cy="3438442"/>
-          </a:xfrm>
-          <a:prstGeom prst="rect">
+        </p:nvSpPr>
+        <p:spPr>
+          <a:xfrm>
+            <a:off x="6871370" y="1715237"/>
+            <a:ext cx="4530705" cy="3427526"/>
+          </a:xfrm>
+          <a:prstGeom prst="ellipse">
             <a:avLst/>
           </a:prstGeom>
-        </p:spPr>
-      </p:pic>
+          <a:solidFill>
+            <a:schemeClr val="bg1">
+              <a:alpha val="39000"/>
+            </a:schemeClr>
+          </a:solidFill>
+          <a:ln w="190500"/>
+        </p:spPr>
+        <p:style>
+          <a:lnRef idx="2">
+            <a:schemeClr val="dk1">
+              <a:shade val="50000"/>
+            </a:schemeClr>
+          </a:lnRef>
+          <a:fillRef idx="1">
+            <a:schemeClr val="dk1"/>
+          </a:fillRef>
+          <a:effectRef idx="0">
+            <a:schemeClr val="dk1"/>
+          </a:effectRef>
+          <a:fontRef idx="minor">
+            <a:schemeClr val="lt1"/>
+          </a:fontRef>
+        </p:style>
+        <p:txBody>
+          <a:bodyPr rtlCol="0" anchor="ctr"/>
+          <a:lstStyle/>
+          <a:p>
+            <a:pPr algn="ctr"/>
+            <a:endParaRPr lang="en-US">
+              <a:ln w="6350">
+                <a:solidFill>
+                  <a:schemeClr val="tx1"/>
+                </a:solidFill>
+              </a:ln>
+            </a:endParaRPr>
+          </a:p>
+        </p:txBody>
+      </p:sp>
+      <p:cxnSp>
+        <p:nvCxnSpPr>
+          <p:cNvPr id="3" name="Straight Connector 2">
+            <a:extLst>
+              <a:ext uri="{FF2B5EF4-FFF2-40B4-BE49-F238E27FC236}">
+                <a16:creationId xmlns:a16="http://schemas.microsoft.com/office/drawing/2014/main" id="{77F6FEE9-8709-4F83-97E6-DA5E743E3839}"/>
+              </a:ext>
+            </a:extLst>
+          </p:cNvPr>
+          <p:cNvCxnSpPr>
+            <a:stCxn id="11" idx="2"/>
+            <a:endCxn id="11" idx="6"/>
+          </p:cNvCxnSpPr>
+          <p:nvPr/>
+        </p:nvCxnSpPr>
+        <p:spPr>
+          <a:xfrm>
+            <a:off x="789925" y="3429000"/>
+            <a:ext cx="4530705" cy="0"/>
+          </a:xfrm>
+          <a:prstGeom prst="line">
+            <a:avLst/>
+          </a:prstGeom>
+        </p:spPr>
+        <p:style>
+          <a:lnRef idx="1">
+            <a:schemeClr val="dk1"/>
+          </a:lnRef>
+          <a:fillRef idx="0">
+            <a:schemeClr val="dk1"/>
+          </a:fillRef>
+          <a:effectRef idx="0">
+            <a:schemeClr val="dk1"/>
+          </a:effectRef>
+          <a:fontRef idx="minor">
+            <a:schemeClr val="tx1"/>
+          </a:fontRef>
+        </p:style>
+      </p:cxnSp>
+      <p:cxnSp>
+        <p:nvCxnSpPr>
+          <p:cNvPr id="8" name="Straight Connector 7">
+            <a:extLst>
+              <a:ext uri="{FF2B5EF4-FFF2-40B4-BE49-F238E27FC236}">
+                <a16:creationId xmlns:a16="http://schemas.microsoft.com/office/drawing/2014/main" id="{1AD34377-88BC-4998-AF8B-CA3E8ECDB752}"/>
+              </a:ext>
+            </a:extLst>
+          </p:cNvPr>
+          <p:cNvCxnSpPr>
+            <a:stCxn id="13" idx="2"/>
+            <a:endCxn id="13" idx="6"/>
+          </p:cNvCxnSpPr>
+          <p:nvPr/>
+        </p:nvCxnSpPr>
+        <p:spPr>
+          <a:xfrm>
+            <a:off x="6871370" y="3429000"/>
+            <a:ext cx="4530705" cy="0"/>
+          </a:xfrm>
+          <a:prstGeom prst="line">
+            <a:avLst/>
+          </a:prstGeom>
+        </p:spPr>
+        <p:style>
+          <a:lnRef idx="1">
+            <a:schemeClr val="dk1"/>
+          </a:lnRef>
+          <a:fillRef idx="0">
+            <a:schemeClr val="dk1"/>
+          </a:fillRef>
+          <a:effectRef idx="0">
+            <a:schemeClr val="dk1"/>
+          </a:effectRef>
+          <a:fontRef idx="minor">
+            <a:schemeClr val="tx1"/>
+          </a:fontRef>
+        </p:style>
+      </p:cxnSp>
     </p:spTree>
     <p:extLst>
       <p:ext uri="{BB962C8B-B14F-4D97-AF65-F5344CB8AC3E}">
-        <p14:creationId xmlns:p14="http://schemas.microsoft.com/office/powerpoint/2010/main" val="2495666797"/>
+        <p14:creationId xmlns:p14="http://schemas.microsoft.com/office/powerpoint/2010/main" val="3715193704"/>
       </p:ext>
     </p:extLst>
   </p:cSld>
@@ -4311,6 +4702,116 @@
           <a:chExt cx="0" cy="0"/>
         </a:xfrm>
       </p:grpSpPr>
+      <p:pic>
+        <p:nvPicPr>
+          <p:cNvPr id="4" name="Content Placeholder 3" descr="Badge Tick1">
+            <a:extLst>
+              <a:ext uri="{FF2B5EF4-FFF2-40B4-BE49-F238E27FC236}">
+                <a16:creationId xmlns:a16="http://schemas.microsoft.com/office/drawing/2014/main" id="{CD198D05-F054-44E6-9DB1-83C86921A8BD}"/>
+              </a:ext>
+            </a:extLst>
+          </p:cNvPr>
+          <p:cNvPicPr>
+            <a:picLocks noGrp="1" noChangeAspect="1"/>
+          </p:cNvPicPr>
+          <p:nvPr>
+            <p:ph idx="1"/>
+          </p:nvPr>
+        </p:nvPicPr>
+        <p:blipFill>
+          <a:blip r:embed="rId2">
+            <a:extLst>
+              <a:ext uri="{28A0092B-C50C-407E-A947-70E740481C1C}">
+                <a14:useLocalDpi xmlns:a14="http://schemas.microsoft.com/office/drawing/2010/main" val="0"/>
+              </a:ext>
+              <a:ext uri="{96DAC541-7B7A-43D3-8B79-37D633B846F1}">
+                <asvg:svgBlip xmlns:asvg="http://schemas.microsoft.com/office/drawing/2016/SVG/main" r:embed="rId3"/>
+              </a:ext>
+            </a:extLst>
+          </a:blip>
+          <a:stretch>
+            <a:fillRect/>
+          </a:stretch>
+        </p:blipFill>
+        <p:spPr>
+          <a:xfrm>
+            <a:off x="6211267" y="1488701"/>
+            <a:ext cx="4627854" cy="3490500"/>
+          </a:xfrm>
+          <a:prstGeom prst="rect">
+            <a:avLst/>
+          </a:prstGeom>
+        </p:spPr>
+      </p:pic>
+      <p:pic>
+        <p:nvPicPr>
+          <p:cNvPr id="5" name="Graphic 4" descr="Badge Tick1">
+            <a:extLst>
+              <a:ext uri="{FF2B5EF4-FFF2-40B4-BE49-F238E27FC236}">
+                <a16:creationId xmlns:a16="http://schemas.microsoft.com/office/drawing/2014/main" id="{23068C95-9B89-496D-97B4-2DA0EC1AE179}"/>
+              </a:ext>
+            </a:extLst>
+          </p:cNvPr>
+          <p:cNvPicPr>
+            <a:picLocks noChangeAspect="1"/>
+          </p:cNvPicPr>
+          <p:nvPr/>
+        </p:nvPicPr>
+        <p:blipFill>
+          <a:blip r:embed="rId2">
+            <a:extLst>
+              <a:ext uri="{28A0092B-C50C-407E-A947-70E740481C1C}">
+                <a14:useLocalDpi xmlns:a14="http://schemas.microsoft.com/office/drawing/2010/main" val="0"/>
+              </a:ext>
+              <a:ext uri="{96DAC541-7B7A-43D3-8B79-37D633B846F1}">
+                <asvg:svgBlip xmlns:asvg="http://schemas.microsoft.com/office/drawing/2016/SVG/main" r:embed="rId3"/>
+              </a:ext>
+            </a:extLst>
+          </a:blip>
+          <a:stretch>
+            <a:fillRect/>
+          </a:stretch>
+        </p:blipFill>
+        <p:spPr>
+          <a:xfrm flipH="1">
+            <a:off x="1219509" y="1409170"/>
+            <a:ext cx="4234400" cy="3649562"/>
+          </a:xfrm>
+          <a:prstGeom prst="rect">
+            <a:avLst/>
+          </a:prstGeom>
+        </p:spPr>
+      </p:pic>
+    </p:spTree>
+    <p:extLst>
+      <p:ext uri="{BB962C8B-B14F-4D97-AF65-F5344CB8AC3E}">
+        <p14:creationId xmlns:p14="http://schemas.microsoft.com/office/powerpoint/2010/main" val="1082207580"/>
+      </p:ext>
+    </p:extLst>
+  </p:cSld>
+  <p:clrMapOvr>
+    <a:masterClrMapping/>
+  </p:clrMapOvr>
+</p:sld>
+</file>
+
+<file path=ppt/slides/slide16.xml><?xml version="1.0" encoding="utf-8"?>
+<p:sld xmlns:a="http://schemas.openxmlformats.org/drawingml/2006/main" xmlns:r="http://schemas.openxmlformats.org/officeDocument/2006/relationships" xmlns:p="http://schemas.openxmlformats.org/presentationml/2006/main">
+  <p:cSld>
+    <p:spTree>
+      <p:nvGrpSpPr>
+        <p:cNvPr id="1" name=""/>
+        <p:cNvGrpSpPr/>
+        <p:nvPr/>
+      </p:nvGrpSpPr>
+      <p:grpSpPr>
+        <a:xfrm>
+          <a:off x="0" y="0"/>
+          <a:ext cx="0" cy="0"/>
+          <a:chOff x="0" y="0"/>
+          <a:chExt cx="0" cy="0"/>
+        </a:xfrm>
+      </p:grpSpPr>
       <p:sp>
         <p:nvSpPr>
           <p:cNvPr id="11" name="Oval 10">
@@ -4332,8 +4833,11 @@
             <a:avLst/>
           </a:prstGeom>
           <a:solidFill>
-            <a:schemeClr val="bg1"/>
+            <a:schemeClr val="bg1">
+              <a:alpha val="39000"/>
+            </a:schemeClr>
           </a:solidFill>
+          <a:ln w="190500"/>
         </p:spPr>
         <p:style>
           <a:lnRef idx="2">
@@ -4366,40 +4870,594 @@
           </a:p>
         </p:txBody>
       </p:sp>
-      <p:pic>
-        <p:nvPicPr>
-          <p:cNvPr id="12" name="Picture 11">
-            <a:extLst>
-              <a:ext uri="{FF2B5EF4-FFF2-40B4-BE49-F238E27FC236}">
-                <a16:creationId xmlns:a16="http://schemas.microsoft.com/office/drawing/2014/main" id="{AD65C418-69FA-41F9-B242-D05157B1B437}"/>
-              </a:ext>
-            </a:extLst>
-          </p:cNvPr>
-          <p:cNvPicPr>
-            <a:picLocks noChangeAspect="1"/>
-          </p:cNvPicPr>
+      <p:sp>
+        <p:nvSpPr>
+          <p:cNvPr id="13" name="Oval 12">
+            <a:extLst>
+              <a:ext uri="{FF2B5EF4-FFF2-40B4-BE49-F238E27FC236}">
+                <a16:creationId xmlns:a16="http://schemas.microsoft.com/office/drawing/2014/main" id="{00895A0D-7E36-4F02-A6BE-5AB1EAD3F88A}"/>
+              </a:ext>
+            </a:extLst>
+          </p:cNvPr>
+          <p:cNvSpPr/>
           <p:nvPr/>
-        </p:nvPicPr>
-        <p:blipFill>
-          <a:blip r:embed="rId2"/>
-          <a:stretch>
-            <a:fillRect/>
-          </a:stretch>
-        </p:blipFill>
-        <p:spPr>
-          <a:xfrm>
-            <a:off x="6871371" y="1698863"/>
-            <a:ext cx="4541914" cy="3438442"/>
-          </a:xfrm>
-          <a:prstGeom prst="rect">
+        </p:nvSpPr>
+        <p:spPr>
+          <a:xfrm>
+            <a:off x="6871370" y="1715237"/>
+            <a:ext cx="4530705" cy="3427526"/>
+          </a:xfrm>
+          <a:prstGeom prst="ellipse">
             <a:avLst/>
           </a:prstGeom>
-        </p:spPr>
-      </p:pic>
+          <a:solidFill>
+            <a:schemeClr val="bg1">
+              <a:alpha val="39000"/>
+            </a:schemeClr>
+          </a:solidFill>
+          <a:ln w="190500"/>
+        </p:spPr>
+        <p:style>
+          <a:lnRef idx="2">
+            <a:schemeClr val="dk1">
+              <a:shade val="50000"/>
+            </a:schemeClr>
+          </a:lnRef>
+          <a:fillRef idx="1">
+            <a:schemeClr val="dk1"/>
+          </a:fillRef>
+          <a:effectRef idx="0">
+            <a:schemeClr val="dk1"/>
+          </a:effectRef>
+          <a:fontRef idx="minor">
+            <a:schemeClr val="lt1"/>
+          </a:fontRef>
+        </p:style>
+        <p:txBody>
+          <a:bodyPr rtlCol="0" anchor="ctr"/>
+          <a:lstStyle/>
+          <a:p>
+            <a:pPr algn="ctr"/>
+            <a:endParaRPr lang="en-US">
+              <a:ln w="6350">
+                <a:solidFill>
+                  <a:schemeClr val="tx1"/>
+                </a:solidFill>
+              </a:ln>
+            </a:endParaRPr>
+          </a:p>
+        </p:txBody>
+      </p:sp>
+      <p:cxnSp>
+        <p:nvCxnSpPr>
+          <p:cNvPr id="3" name="Straight Connector 2">
+            <a:extLst>
+              <a:ext uri="{FF2B5EF4-FFF2-40B4-BE49-F238E27FC236}">
+                <a16:creationId xmlns:a16="http://schemas.microsoft.com/office/drawing/2014/main" id="{77F6FEE9-8709-4F83-97E6-DA5E743E3839}"/>
+              </a:ext>
+            </a:extLst>
+          </p:cNvPr>
+          <p:cNvCxnSpPr>
+            <a:stCxn id="11" idx="2"/>
+            <a:endCxn id="11" idx="6"/>
+          </p:cNvCxnSpPr>
+          <p:nvPr/>
+        </p:nvCxnSpPr>
+        <p:spPr>
+          <a:xfrm>
+            <a:off x="789925" y="3429000"/>
+            <a:ext cx="4530705" cy="0"/>
+          </a:xfrm>
+          <a:prstGeom prst="line">
+            <a:avLst/>
+          </a:prstGeom>
+        </p:spPr>
+        <p:style>
+          <a:lnRef idx="1">
+            <a:schemeClr val="dk1"/>
+          </a:lnRef>
+          <a:fillRef idx="0">
+            <a:schemeClr val="dk1"/>
+          </a:fillRef>
+          <a:effectRef idx="0">
+            <a:schemeClr val="dk1"/>
+          </a:effectRef>
+          <a:fontRef idx="minor">
+            <a:schemeClr val="tx1"/>
+          </a:fontRef>
+        </p:style>
+      </p:cxnSp>
+      <p:cxnSp>
+        <p:nvCxnSpPr>
+          <p:cNvPr id="8" name="Straight Connector 7">
+            <a:extLst>
+              <a:ext uri="{FF2B5EF4-FFF2-40B4-BE49-F238E27FC236}">
+                <a16:creationId xmlns:a16="http://schemas.microsoft.com/office/drawing/2014/main" id="{1AD34377-88BC-4998-AF8B-CA3E8ECDB752}"/>
+              </a:ext>
+            </a:extLst>
+          </p:cNvPr>
+          <p:cNvCxnSpPr>
+            <a:stCxn id="13" idx="2"/>
+            <a:endCxn id="13" idx="6"/>
+          </p:cNvCxnSpPr>
+          <p:nvPr/>
+        </p:nvCxnSpPr>
+        <p:spPr>
+          <a:xfrm>
+            <a:off x="6871370" y="3429000"/>
+            <a:ext cx="4530705" cy="0"/>
+          </a:xfrm>
+          <a:prstGeom prst="line">
+            <a:avLst/>
+          </a:prstGeom>
+        </p:spPr>
+        <p:style>
+          <a:lnRef idx="1">
+            <a:schemeClr val="dk1"/>
+          </a:lnRef>
+          <a:fillRef idx="0">
+            <a:schemeClr val="dk1"/>
+          </a:fillRef>
+          <a:effectRef idx="0">
+            <a:schemeClr val="dk1"/>
+          </a:effectRef>
+          <a:fontRef idx="minor">
+            <a:schemeClr val="tx1"/>
+          </a:fontRef>
+        </p:style>
+      </p:cxnSp>
     </p:spTree>
     <p:extLst>
       <p:ext uri="{BB962C8B-B14F-4D97-AF65-F5344CB8AC3E}">
-        <p14:creationId xmlns:p14="http://schemas.microsoft.com/office/powerpoint/2010/main" val="116840828"/>
+        <p14:creationId xmlns:p14="http://schemas.microsoft.com/office/powerpoint/2010/main" val="78535453"/>
+      </p:ext>
+    </p:extLst>
+  </p:cSld>
+  <p:clrMapOvr>
+    <a:masterClrMapping/>
+  </p:clrMapOvr>
+</p:sld>
+</file>
+
+<file path=ppt/slides/slide17.xml><?xml version="1.0" encoding="utf-8"?>
+<p:sld xmlns:a="http://schemas.openxmlformats.org/drawingml/2006/main" xmlns:r="http://schemas.openxmlformats.org/officeDocument/2006/relationships" xmlns:p="http://schemas.openxmlformats.org/presentationml/2006/main">
+  <p:cSld>
+    <p:spTree>
+      <p:nvGrpSpPr>
+        <p:cNvPr id="1" name=""/>
+        <p:cNvGrpSpPr/>
+        <p:nvPr/>
+      </p:nvGrpSpPr>
+      <p:grpSpPr>
+        <a:xfrm>
+          <a:off x="0" y="0"/>
+          <a:ext cx="0" cy="0"/>
+          <a:chOff x="0" y="0"/>
+          <a:chExt cx="0" cy="0"/>
+        </a:xfrm>
+      </p:grpSpPr>
+      <p:sp>
+        <p:nvSpPr>
+          <p:cNvPr id="11" name="Oval 10">
+            <a:extLst>
+              <a:ext uri="{FF2B5EF4-FFF2-40B4-BE49-F238E27FC236}">
+                <a16:creationId xmlns:a16="http://schemas.microsoft.com/office/drawing/2014/main" id="{80FA8DB1-DA72-4F1C-9F56-F46DC83C584D}"/>
+              </a:ext>
+            </a:extLst>
+          </p:cNvPr>
+          <p:cNvSpPr/>
+          <p:nvPr/>
+        </p:nvSpPr>
+        <p:spPr>
+          <a:xfrm>
+            <a:off x="789925" y="1715237"/>
+            <a:ext cx="4530705" cy="3427526"/>
+          </a:xfrm>
+          <a:prstGeom prst="ellipse">
+            <a:avLst/>
+          </a:prstGeom>
+          <a:solidFill>
+            <a:schemeClr val="bg1">
+              <a:alpha val="39000"/>
+            </a:schemeClr>
+          </a:solidFill>
+          <a:ln w="190500"/>
+        </p:spPr>
+        <p:style>
+          <a:lnRef idx="2">
+            <a:schemeClr val="dk1">
+              <a:shade val="50000"/>
+            </a:schemeClr>
+          </a:lnRef>
+          <a:fillRef idx="1">
+            <a:schemeClr val="dk1"/>
+          </a:fillRef>
+          <a:effectRef idx="0">
+            <a:schemeClr val="dk1"/>
+          </a:effectRef>
+          <a:fontRef idx="minor">
+            <a:schemeClr val="lt1"/>
+          </a:fontRef>
+        </p:style>
+        <p:txBody>
+          <a:bodyPr rtlCol="0" anchor="ctr"/>
+          <a:lstStyle/>
+          <a:p>
+            <a:pPr algn="ctr"/>
+            <a:endParaRPr lang="en-US">
+              <a:ln w="6350">
+                <a:solidFill>
+                  <a:schemeClr val="tx1"/>
+                </a:solidFill>
+              </a:ln>
+            </a:endParaRPr>
+          </a:p>
+        </p:txBody>
+      </p:sp>
+      <p:sp>
+        <p:nvSpPr>
+          <p:cNvPr id="13" name="Oval 12">
+            <a:extLst>
+              <a:ext uri="{FF2B5EF4-FFF2-40B4-BE49-F238E27FC236}">
+                <a16:creationId xmlns:a16="http://schemas.microsoft.com/office/drawing/2014/main" id="{00895A0D-7E36-4F02-A6BE-5AB1EAD3F88A}"/>
+              </a:ext>
+            </a:extLst>
+          </p:cNvPr>
+          <p:cNvSpPr/>
+          <p:nvPr/>
+        </p:nvSpPr>
+        <p:spPr>
+          <a:xfrm>
+            <a:off x="6871370" y="1715237"/>
+            <a:ext cx="4530705" cy="3427526"/>
+          </a:xfrm>
+          <a:prstGeom prst="ellipse">
+            <a:avLst/>
+          </a:prstGeom>
+          <a:solidFill>
+            <a:schemeClr val="bg1">
+              <a:alpha val="39000"/>
+            </a:schemeClr>
+          </a:solidFill>
+          <a:ln w="190500"/>
+        </p:spPr>
+        <p:style>
+          <a:lnRef idx="2">
+            <a:schemeClr val="dk1">
+              <a:shade val="50000"/>
+            </a:schemeClr>
+          </a:lnRef>
+          <a:fillRef idx="1">
+            <a:schemeClr val="dk1"/>
+          </a:fillRef>
+          <a:effectRef idx="0">
+            <a:schemeClr val="dk1"/>
+          </a:effectRef>
+          <a:fontRef idx="minor">
+            <a:schemeClr val="lt1"/>
+          </a:fontRef>
+        </p:style>
+        <p:txBody>
+          <a:bodyPr rtlCol="0" anchor="ctr"/>
+          <a:lstStyle/>
+          <a:p>
+            <a:pPr algn="ctr"/>
+            <a:endParaRPr lang="en-US">
+              <a:ln w="6350">
+                <a:solidFill>
+                  <a:schemeClr val="tx1"/>
+                </a:solidFill>
+              </a:ln>
+            </a:endParaRPr>
+          </a:p>
+        </p:txBody>
+      </p:sp>
+      <p:cxnSp>
+        <p:nvCxnSpPr>
+          <p:cNvPr id="3" name="Straight Connector 2">
+            <a:extLst>
+              <a:ext uri="{FF2B5EF4-FFF2-40B4-BE49-F238E27FC236}">
+                <a16:creationId xmlns:a16="http://schemas.microsoft.com/office/drawing/2014/main" id="{77F6FEE9-8709-4F83-97E6-DA5E743E3839}"/>
+              </a:ext>
+            </a:extLst>
+          </p:cNvPr>
+          <p:cNvCxnSpPr>
+            <a:stCxn id="11" idx="2"/>
+            <a:endCxn id="11" idx="6"/>
+          </p:cNvCxnSpPr>
+          <p:nvPr/>
+        </p:nvCxnSpPr>
+        <p:spPr>
+          <a:xfrm>
+            <a:off x="789925" y="3429000"/>
+            <a:ext cx="4530705" cy="0"/>
+          </a:xfrm>
+          <a:prstGeom prst="line">
+            <a:avLst/>
+          </a:prstGeom>
+        </p:spPr>
+        <p:style>
+          <a:lnRef idx="1">
+            <a:schemeClr val="dk1"/>
+          </a:lnRef>
+          <a:fillRef idx="0">
+            <a:schemeClr val="dk1"/>
+          </a:fillRef>
+          <a:effectRef idx="0">
+            <a:schemeClr val="dk1"/>
+          </a:effectRef>
+          <a:fontRef idx="minor">
+            <a:schemeClr val="tx1"/>
+          </a:fontRef>
+        </p:style>
+      </p:cxnSp>
+      <p:cxnSp>
+        <p:nvCxnSpPr>
+          <p:cNvPr id="8" name="Straight Connector 7">
+            <a:extLst>
+              <a:ext uri="{FF2B5EF4-FFF2-40B4-BE49-F238E27FC236}">
+                <a16:creationId xmlns:a16="http://schemas.microsoft.com/office/drawing/2014/main" id="{1AD34377-88BC-4998-AF8B-CA3E8ECDB752}"/>
+              </a:ext>
+            </a:extLst>
+          </p:cNvPr>
+          <p:cNvCxnSpPr>
+            <a:stCxn id="13" idx="2"/>
+            <a:endCxn id="13" idx="6"/>
+          </p:cNvCxnSpPr>
+          <p:nvPr/>
+        </p:nvCxnSpPr>
+        <p:spPr>
+          <a:xfrm>
+            <a:off x="6871370" y="3429000"/>
+            <a:ext cx="4530705" cy="0"/>
+          </a:xfrm>
+          <a:prstGeom prst="line">
+            <a:avLst/>
+          </a:prstGeom>
+        </p:spPr>
+        <p:style>
+          <a:lnRef idx="1">
+            <a:schemeClr val="dk1"/>
+          </a:lnRef>
+          <a:fillRef idx="0">
+            <a:schemeClr val="dk1"/>
+          </a:fillRef>
+          <a:effectRef idx="0">
+            <a:schemeClr val="dk1"/>
+          </a:effectRef>
+          <a:fontRef idx="minor">
+            <a:schemeClr val="tx1"/>
+          </a:fontRef>
+        </p:style>
+      </p:cxnSp>
+    </p:spTree>
+    <p:extLst>
+      <p:ext uri="{BB962C8B-B14F-4D97-AF65-F5344CB8AC3E}">
+        <p14:creationId xmlns:p14="http://schemas.microsoft.com/office/powerpoint/2010/main" val="1913704596"/>
+      </p:ext>
+    </p:extLst>
+  </p:cSld>
+  <p:clrMapOvr>
+    <a:masterClrMapping/>
+  </p:clrMapOvr>
+</p:sld>
+</file>
+
+<file path=ppt/slides/slide18.xml><?xml version="1.0" encoding="utf-8"?>
+<p:sld xmlns:a="http://schemas.openxmlformats.org/drawingml/2006/main" xmlns:r="http://schemas.openxmlformats.org/officeDocument/2006/relationships" xmlns:p="http://schemas.openxmlformats.org/presentationml/2006/main">
+  <p:cSld>
+    <p:spTree>
+      <p:nvGrpSpPr>
+        <p:cNvPr id="1" name=""/>
+        <p:cNvGrpSpPr/>
+        <p:nvPr/>
+      </p:nvGrpSpPr>
+      <p:grpSpPr>
+        <a:xfrm>
+          <a:off x="0" y="0"/>
+          <a:ext cx="0" cy="0"/>
+          <a:chOff x="0" y="0"/>
+          <a:chExt cx="0" cy="0"/>
+        </a:xfrm>
+      </p:grpSpPr>
+      <p:sp>
+        <p:nvSpPr>
+          <p:cNvPr id="11" name="Oval 10">
+            <a:extLst>
+              <a:ext uri="{FF2B5EF4-FFF2-40B4-BE49-F238E27FC236}">
+                <a16:creationId xmlns:a16="http://schemas.microsoft.com/office/drawing/2014/main" id="{80FA8DB1-DA72-4F1C-9F56-F46DC83C584D}"/>
+              </a:ext>
+            </a:extLst>
+          </p:cNvPr>
+          <p:cNvSpPr/>
+          <p:nvPr/>
+        </p:nvSpPr>
+        <p:spPr>
+          <a:xfrm>
+            <a:off x="789925" y="1715237"/>
+            <a:ext cx="4530705" cy="3427526"/>
+          </a:xfrm>
+          <a:prstGeom prst="ellipse">
+            <a:avLst/>
+          </a:prstGeom>
+          <a:solidFill>
+            <a:schemeClr val="bg1">
+              <a:alpha val="39000"/>
+            </a:schemeClr>
+          </a:solidFill>
+          <a:ln w="190500"/>
+        </p:spPr>
+        <p:style>
+          <a:lnRef idx="2">
+            <a:schemeClr val="dk1">
+              <a:shade val="50000"/>
+            </a:schemeClr>
+          </a:lnRef>
+          <a:fillRef idx="1">
+            <a:schemeClr val="dk1"/>
+          </a:fillRef>
+          <a:effectRef idx="0">
+            <a:schemeClr val="dk1"/>
+          </a:effectRef>
+          <a:fontRef idx="minor">
+            <a:schemeClr val="lt1"/>
+          </a:fontRef>
+        </p:style>
+        <p:txBody>
+          <a:bodyPr rtlCol="0" anchor="ctr"/>
+          <a:lstStyle/>
+          <a:p>
+            <a:pPr algn="ctr"/>
+            <a:endParaRPr lang="en-US">
+              <a:ln w="6350">
+                <a:solidFill>
+                  <a:schemeClr val="tx1"/>
+                </a:solidFill>
+              </a:ln>
+            </a:endParaRPr>
+          </a:p>
+        </p:txBody>
+      </p:sp>
+      <p:sp>
+        <p:nvSpPr>
+          <p:cNvPr id="13" name="Oval 12">
+            <a:extLst>
+              <a:ext uri="{FF2B5EF4-FFF2-40B4-BE49-F238E27FC236}">
+                <a16:creationId xmlns:a16="http://schemas.microsoft.com/office/drawing/2014/main" id="{00895A0D-7E36-4F02-A6BE-5AB1EAD3F88A}"/>
+              </a:ext>
+            </a:extLst>
+          </p:cNvPr>
+          <p:cNvSpPr/>
+          <p:nvPr/>
+        </p:nvSpPr>
+        <p:spPr>
+          <a:xfrm>
+            <a:off x="6871370" y="1715237"/>
+            <a:ext cx="4530705" cy="3427526"/>
+          </a:xfrm>
+          <a:prstGeom prst="ellipse">
+            <a:avLst/>
+          </a:prstGeom>
+          <a:solidFill>
+            <a:schemeClr val="bg1">
+              <a:alpha val="39000"/>
+            </a:schemeClr>
+          </a:solidFill>
+          <a:ln w="190500"/>
+        </p:spPr>
+        <p:style>
+          <a:lnRef idx="2">
+            <a:schemeClr val="dk1">
+              <a:shade val="50000"/>
+            </a:schemeClr>
+          </a:lnRef>
+          <a:fillRef idx="1">
+            <a:schemeClr val="dk1"/>
+          </a:fillRef>
+          <a:effectRef idx="0">
+            <a:schemeClr val="dk1"/>
+          </a:effectRef>
+          <a:fontRef idx="minor">
+            <a:schemeClr val="lt1"/>
+          </a:fontRef>
+        </p:style>
+        <p:txBody>
+          <a:bodyPr rtlCol="0" anchor="ctr"/>
+          <a:lstStyle/>
+          <a:p>
+            <a:pPr algn="ctr"/>
+            <a:endParaRPr lang="en-US">
+              <a:ln w="6350">
+                <a:solidFill>
+                  <a:schemeClr val="tx1"/>
+                </a:solidFill>
+              </a:ln>
+            </a:endParaRPr>
+          </a:p>
+        </p:txBody>
+      </p:sp>
+      <p:cxnSp>
+        <p:nvCxnSpPr>
+          <p:cNvPr id="3" name="Straight Connector 2">
+            <a:extLst>
+              <a:ext uri="{FF2B5EF4-FFF2-40B4-BE49-F238E27FC236}">
+                <a16:creationId xmlns:a16="http://schemas.microsoft.com/office/drawing/2014/main" id="{77F6FEE9-8709-4F83-97E6-DA5E743E3839}"/>
+              </a:ext>
+            </a:extLst>
+          </p:cNvPr>
+          <p:cNvCxnSpPr>
+            <a:stCxn id="11" idx="2"/>
+            <a:endCxn id="11" idx="6"/>
+          </p:cNvCxnSpPr>
+          <p:nvPr/>
+        </p:nvCxnSpPr>
+        <p:spPr>
+          <a:xfrm>
+            <a:off x="789925" y="3429000"/>
+            <a:ext cx="4530705" cy="0"/>
+          </a:xfrm>
+          <a:prstGeom prst="line">
+            <a:avLst/>
+          </a:prstGeom>
+        </p:spPr>
+        <p:style>
+          <a:lnRef idx="1">
+            <a:schemeClr val="dk1"/>
+          </a:lnRef>
+          <a:fillRef idx="0">
+            <a:schemeClr val="dk1"/>
+          </a:fillRef>
+          <a:effectRef idx="0">
+            <a:schemeClr val="dk1"/>
+          </a:effectRef>
+          <a:fontRef idx="minor">
+            <a:schemeClr val="tx1"/>
+          </a:fontRef>
+        </p:style>
+      </p:cxnSp>
+      <p:cxnSp>
+        <p:nvCxnSpPr>
+          <p:cNvPr id="8" name="Straight Connector 7">
+            <a:extLst>
+              <a:ext uri="{FF2B5EF4-FFF2-40B4-BE49-F238E27FC236}">
+                <a16:creationId xmlns:a16="http://schemas.microsoft.com/office/drawing/2014/main" id="{1AD34377-88BC-4998-AF8B-CA3E8ECDB752}"/>
+              </a:ext>
+            </a:extLst>
+          </p:cNvPr>
+          <p:cNvCxnSpPr>
+            <a:stCxn id="13" idx="2"/>
+            <a:endCxn id="13" idx="6"/>
+          </p:cNvCxnSpPr>
+          <p:nvPr/>
+        </p:nvCxnSpPr>
+        <p:spPr>
+          <a:xfrm>
+            <a:off x="6871370" y="3429000"/>
+            <a:ext cx="4530705" cy="0"/>
+          </a:xfrm>
+          <a:prstGeom prst="line">
+            <a:avLst/>
+          </a:prstGeom>
+        </p:spPr>
+        <p:style>
+          <a:lnRef idx="1">
+            <a:schemeClr val="dk1"/>
+          </a:lnRef>
+          <a:fillRef idx="0">
+            <a:schemeClr val="dk1"/>
+          </a:fillRef>
+          <a:effectRef idx="0">
+            <a:schemeClr val="dk1"/>
+          </a:effectRef>
+          <a:fontRef idx="minor">
+            <a:schemeClr val="tx1"/>
+          </a:fontRef>
+        </p:style>
+      </p:cxnSp>
+    </p:spTree>
+    <p:extLst>
+      <p:ext uri="{BB962C8B-B14F-4D97-AF65-F5344CB8AC3E}">
+        <p14:creationId xmlns:p14="http://schemas.microsoft.com/office/powerpoint/2010/main" val="2189473913"/>
       </p:ext>
     </p:extLst>
   </p:cSld>
@@ -5787,84 +6845,6 @@
           </a:p>
         </p:txBody>
       </p:sp>
-      <p:cxnSp>
-        <p:nvCxnSpPr>
-          <p:cNvPr id="3" name="Straight Connector 2">
-            <a:extLst>
-              <a:ext uri="{FF2B5EF4-FFF2-40B4-BE49-F238E27FC236}">
-                <a16:creationId xmlns:a16="http://schemas.microsoft.com/office/drawing/2014/main" id="{77F6FEE9-8709-4F83-97E6-DA5E743E3839}"/>
-              </a:ext>
-            </a:extLst>
-          </p:cNvPr>
-          <p:cNvCxnSpPr>
-            <a:stCxn id="11" idx="2"/>
-            <a:endCxn id="11" idx="6"/>
-          </p:cNvCxnSpPr>
-          <p:nvPr/>
-        </p:nvCxnSpPr>
-        <p:spPr>
-          <a:xfrm>
-            <a:off x="789925" y="3429000"/>
-            <a:ext cx="4530705" cy="0"/>
-          </a:xfrm>
-          <a:prstGeom prst="line">
-            <a:avLst/>
-          </a:prstGeom>
-        </p:spPr>
-        <p:style>
-          <a:lnRef idx="1">
-            <a:schemeClr val="dk1"/>
-          </a:lnRef>
-          <a:fillRef idx="0">
-            <a:schemeClr val="dk1"/>
-          </a:fillRef>
-          <a:effectRef idx="0">
-            <a:schemeClr val="dk1"/>
-          </a:effectRef>
-          <a:fontRef idx="minor">
-            <a:schemeClr val="tx1"/>
-          </a:fontRef>
-        </p:style>
-      </p:cxnSp>
-      <p:cxnSp>
-        <p:nvCxnSpPr>
-          <p:cNvPr id="8" name="Straight Connector 7">
-            <a:extLst>
-              <a:ext uri="{FF2B5EF4-FFF2-40B4-BE49-F238E27FC236}">
-                <a16:creationId xmlns:a16="http://schemas.microsoft.com/office/drawing/2014/main" id="{1AD34377-88BC-4998-AF8B-CA3E8ECDB752}"/>
-              </a:ext>
-            </a:extLst>
-          </p:cNvPr>
-          <p:cNvCxnSpPr>
-            <a:stCxn id="13" idx="2"/>
-            <a:endCxn id="13" idx="6"/>
-          </p:cNvCxnSpPr>
-          <p:nvPr/>
-        </p:nvCxnSpPr>
-        <p:spPr>
-          <a:xfrm>
-            <a:off x="6871370" y="3429000"/>
-            <a:ext cx="4530705" cy="0"/>
-          </a:xfrm>
-          <a:prstGeom prst="line">
-            <a:avLst/>
-          </a:prstGeom>
-        </p:spPr>
-        <p:style>
-          <a:lnRef idx="1">
-            <a:schemeClr val="dk1"/>
-          </a:lnRef>
-          <a:fillRef idx="0">
-            <a:schemeClr val="dk1"/>
-          </a:fillRef>
-          <a:effectRef idx="0">
-            <a:schemeClr val="dk1"/>
-          </a:effectRef>
-          <a:fontRef idx="minor">
-            <a:schemeClr val="tx1"/>
-          </a:fontRef>
-        </p:style>
-      </p:cxnSp>
       <p:pic>
         <p:nvPicPr>
           <p:cNvPr id="4" name="Graphic 3" descr="Carrot Right">
@@ -5896,7 +6876,7 @@
         </p:blipFill>
         <p:spPr>
           <a:xfrm>
-            <a:off x="7960821" y="1925961"/>
+            <a:off x="7770515" y="1925960"/>
             <a:ext cx="3006077" cy="3006077"/>
           </a:xfrm>
           <a:prstGeom prst="rect">
@@ -5935,7 +6915,7 @@
         </p:blipFill>
         <p:spPr>
           <a:xfrm>
-            <a:off x="789925" y="1797986"/>
+            <a:off x="1249447" y="1797984"/>
             <a:ext cx="3262028" cy="3262028"/>
           </a:xfrm>
           <a:prstGeom prst="rect">
@@ -5973,6 +6953,84 @@
           <a:chExt cx="0" cy="0"/>
         </a:xfrm>
       </p:grpSpPr>
+      <p:pic>
+        <p:nvPicPr>
+          <p:cNvPr id="10" name="Graphic 9" descr="Carrot Up">
+            <a:extLst>
+              <a:ext uri="{FF2B5EF4-FFF2-40B4-BE49-F238E27FC236}">
+                <a16:creationId xmlns:a16="http://schemas.microsoft.com/office/drawing/2014/main" id="{55B3FBFD-A622-42FB-8F16-D01C7FC20146}"/>
+              </a:ext>
+            </a:extLst>
+          </p:cNvPr>
+          <p:cNvPicPr>
+            <a:picLocks noChangeAspect="1"/>
+          </p:cNvPicPr>
+          <p:nvPr/>
+        </p:nvPicPr>
+        <p:blipFill>
+          <a:blip r:embed="rId2">
+            <a:extLst>
+              <a:ext uri="{28A0092B-C50C-407E-A947-70E740481C1C}">
+                <a14:useLocalDpi xmlns:a14="http://schemas.microsoft.com/office/drawing/2010/main" val="0"/>
+              </a:ext>
+              <a:ext uri="{96DAC541-7B7A-43D3-8B79-37D633B846F1}">
+                <asvg:svgBlip xmlns:asvg="http://schemas.microsoft.com/office/drawing/2016/SVG/main" r:embed="rId3"/>
+              </a:ext>
+            </a:extLst>
+          </a:blip>
+          <a:stretch>
+            <a:fillRect/>
+          </a:stretch>
+        </p:blipFill>
+        <p:spPr>
+          <a:xfrm>
+            <a:off x="6800675" y="1370176"/>
+            <a:ext cx="4672093" cy="3772587"/>
+          </a:xfrm>
+          <a:prstGeom prst="rect">
+            <a:avLst/>
+          </a:prstGeom>
+        </p:spPr>
+      </p:pic>
+      <p:pic>
+        <p:nvPicPr>
+          <p:cNvPr id="9" name="Graphic 8" descr="Carrot Up">
+            <a:extLst>
+              <a:ext uri="{FF2B5EF4-FFF2-40B4-BE49-F238E27FC236}">
+                <a16:creationId xmlns:a16="http://schemas.microsoft.com/office/drawing/2014/main" id="{5A0B9DD7-FF7F-43CA-8505-52B76D22DD42}"/>
+              </a:ext>
+            </a:extLst>
+          </p:cNvPr>
+          <p:cNvPicPr>
+            <a:picLocks noChangeAspect="1"/>
+          </p:cNvPicPr>
+          <p:nvPr/>
+        </p:nvPicPr>
+        <p:blipFill>
+          <a:blip r:embed="rId2">
+            <a:extLst>
+              <a:ext uri="{28A0092B-C50C-407E-A947-70E740481C1C}">
+                <a14:useLocalDpi xmlns:a14="http://schemas.microsoft.com/office/drawing/2010/main" val="0"/>
+              </a:ext>
+              <a:ext uri="{96DAC541-7B7A-43D3-8B79-37D633B846F1}">
+                <asvg:svgBlip xmlns:asvg="http://schemas.microsoft.com/office/drawing/2016/SVG/main" r:embed="rId3"/>
+              </a:ext>
+            </a:extLst>
+          </a:blip>
+          <a:stretch>
+            <a:fillRect/>
+          </a:stretch>
+        </p:blipFill>
+        <p:spPr>
+          <a:xfrm>
+            <a:off x="648537" y="1370176"/>
+            <a:ext cx="4672093" cy="3772587"/>
+          </a:xfrm>
+          <a:prstGeom prst="rect">
+            <a:avLst/>
+          </a:prstGeom>
+        </p:spPr>
+      </p:pic>
       <p:sp>
         <p:nvSpPr>
           <p:cNvPr id="11" name="Oval 10">
@@ -6089,162 +7147,6 @@
           </a:p>
         </p:txBody>
       </p:sp>
-      <p:cxnSp>
-        <p:nvCxnSpPr>
-          <p:cNvPr id="3" name="Straight Connector 2">
-            <a:extLst>
-              <a:ext uri="{FF2B5EF4-FFF2-40B4-BE49-F238E27FC236}">
-                <a16:creationId xmlns:a16="http://schemas.microsoft.com/office/drawing/2014/main" id="{77F6FEE9-8709-4F83-97E6-DA5E743E3839}"/>
-              </a:ext>
-            </a:extLst>
-          </p:cNvPr>
-          <p:cNvCxnSpPr>
-            <a:stCxn id="11" idx="2"/>
-            <a:endCxn id="11" idx="6"/>
-          </p:cNvCxnSpPr>
-          <p:nvPr/>
-        </p:nvCxnSpPr>
-        <p:spPr>
-          <a:xfrm>
-            <a:off x="789925" y="3429000"/>
-            <a:ext cx="4530705" cy="0"/>
-          </a:xfrm>
-          <a:prstGeom prst="line">
-            <a:avLst/>
-          </a:prstGeom>
-        </p:spPr>
-        <p:style>
-          <a:lnRef idx="1">
-            <a:schemeClr val="dk1"/>
-          </a:lnRef>
-          <a:fillRef idx="0">
-            <a:schemeClr val="dk1"/>
-          </a:fillRef>
-          <a:effectRef idx="0">
-            <a:schemeClr val="dk1"/>
-          </a:effectRef>
-          <a:fontRef idx="minor">
-            <a:schemeClr val="tx1"/>
-          </a:fontRef>
-        </p:style>
-      </p:cxnSp>
-      <p:cxnSp>
-        <p:nvCxnSpPr>
-          <p:cNvPr id="8" name="Straight Connector 7">
-            <a:extLst>
-              <a:ext uri="{FF2B5EF4-FFF2-40B4-BE49-F238E27FC236}">
-                <a16:creationId xmlns:a16="http://schemas.microsoft.com/office/drawing/2014/main" id="{1AD34377-88BC-4998-AF8B-CA3E8ECDB752}"/>
-              </a:ext>
-            </a:extLst>
-          </p:cNvPr>
-          <p:cNvCxnSpPr>
-            <a:stCxn id="13" idx="2"/>
-            <a:endCxn id="13" idx="6"/>
-          </p:cNvCxnSpPr>
-          <p:nvPr/>
-        </p:nvCxnSpPr>
-        <p:spPr>
-          <a:xfrm>
-            <a:off x="6871370" y="3429000"/>
-            <a:ext cx="4530705" cy="0"/>
-          </a:xfrm>
-          <a:prstGeom prst="line">
-            <a:avLst/>
-          </a:prstGeom>
-        </p:spPr>
-        <p:style>
-          <a:lnRef idx="1">
-            <a:schemeClr val="dk1"/>
-          </a:lnRef>
-          <a:fillRef idx="0">
-            <a:schemeClr val="dk1"/>
-          </a:fillRef>
-          <a:effectRef idx="0">
-            <a:schemeClr val="dk1"/>
-          </a:effectRef>
-          <a:fontRef idx="minor">
-            <a:schemeClr val="tx1"/>
-          </a:fontRef>
-        </p:style>
-      </p:cxnSp>
-      <p:pic>
-        <p:nvPicPr>
-          <p:cNvPr id="9" name="Graphic 8" descr="Carrot Up">
-            <a:extLst>
-              <a:ext uri="{FF2B5EF4-FFF2-40B4-BE49-F238E27FC236}">
-                <a16:creationId xmlns:a16="http://schemas.microsoft.com/office/drawing/2014/main" id="{5A0B9DD7-FF7F-43CA-8505-52B76D22DD42}"/>
-              </a:ext>
-            </a:extLst>
-          </p:cNvPr>
-          <p:cNvPicPr>
-            <a:picLocks noChangeAspect="1"/>
-          </p:cNvPicPr>
-          <p:nvPr/>
-        </p:nvPicPr>
-        <p:blipFill>
-          <a:blip r:embed="rId2">
-            <a:extLst>
-              <a:ext uri="{28A0092B-C50C-407E-A947-70E740481C1C}">
-                <a14:useLocalDpi xmlns:a14="http://schemas.microsoft.com/office/drawing/2010/main" val="0"/>
-              </a:ext>
-              <a:ext uri="{96DAC541-7B7A-43D3-8B79-37D633B846F1}">
-                <asvg:svgBlip xmlns:asvg="http://schemas.microsoft.com/office/drawing/2016/SVG/main" r:embed="rId3"/>
-              </a:ext>
-            </a:extLst>
-          </a:blip>
-          <a:stretch>
-            <a:fillRect/>
-          </a:stretch>
-        </p:blipFill>
-        <p:spPr>
-          <a:xfrm>
-            <a:off x="648537" y="1370176"/>
-            <a:ext cx="4672093" cy="3772587"/>
-          </a:xfrm>
-          <a:prstGeom prst="rect">
-            <a:avLst/>
-          </a:prstGeom>
-        </p:spPr>
-      </p:pic>
-      <p:pic>
-        <p:nvPicPr>
-          <p:cNvPr id="10" name="Graphic 9" descr="Carrot Up">
-            <a:extLst>
-              <a:ext uri="{FF2B5EF4-FFF2-40B4-BE49-F238E27FC236}">
-                <a16:creationId xmlns:a16="http://schemas.microsoft.com/office/drawing/2014/main" id="{55B3FBFD-A622-42FB-8F16-D01C7FC20146}"/>
-              </a:ext>
-            </a:extLst>
-          </p:cNvPr>
-          <p:cNvPicPr>
-            <a:picLocks noChangeAspect="1"/>
-          </p:cNvPicPr>
-          <p:nvPr/>
-        </p:nvPicPr>
-        <p:blipFill>
-          <a:blip r:embed="rId2">
-            <a:extLst>
-              <a:ext uri="{28A0092B-C50C-407E-A947-70E740481C1C}">
-                <a14:useLocalDpi xmlns:a14="http://schemas.microsoft.com/office/drawing/2010/main" val="0"/>
-              </a:ext>
-              <a:ext uri="{96DAC541-7B7A-43D3-8B79-37D633B846F1}">
-                <asvg:svgBlip xmlns:asvg="http://schemas.microsoft.com/office/drawing/2016/SVG/main" r:embed="rId3"/>
-              </a:ext>
-            </a:extLst>
-          </a:blip>
-          <a:stretch>
-            <a:fillRect/>
-          </a:stretch>
-        </p:blipFill>
-        <p:spPr>
-          <a:xfrm>
-            <a:off x="6800675" y="1370176"/>
-            <a:ext cx="4672093" cy="3772587"/>
-          </a:xfrm>
-          <a:prstGeom prst="rect">
-            <a:avLst/>
-          </a:prstGeom>
-        </p:spPr>
-      </p:pic>
     </p:spTree>
     <p:extLst>
       <p:ext uri="{BB962C8B-B14F-4D97-AF65-F5344CB8AC3E}">

</xml_diff>

<commit_message>
additional screen deck updates
simplified guide page
</commit_message>
<xml_diff>
--- a/Experiments/OLED_Screen/doc/screen_deck.pptx
+++ b/Experiments/OLED_Screen/doc/screen_deck.pptx
@@ -276,7 +276,7 @@
           <a:p>
             <a:fld id="{477E4798-8B83-41D6-B8E2-2E5E8090BEC2}" type="datetimeFigureOut">
               <a:rPr lang="en-US" smtClean="0"/>
-              <a:t>5/6/2020</a:t>
+              <a:t>5/12/2020</a:t>
             </a:fld>
             <a:endParaRPr lang="en-US"/>
           </a:p>
@@ -474,7 +474,7 @@
           <a:p>
             <a:fld id="{477E4798-8B83-41D6-B8E2-2E5E8090BEC2}" type="datetimeFigureOut">
               <a:rPr lang="en-US" smtClean="0"/>
-              <a:t>5/6/2020</a:t>
+              <a:t>5/12/2020</a:t>
             </a:fld>
             <a:endParaRPr lang="en-US"/>
           </a:p>
@@ -682,7 +682,7 @@
           <a:p>
             <a:fld id="{477E4798-8B83-41D6-B8E2-2E5E8090BEC2}" type="datetimeFigureOut">
               <a:rPr lang="en-US" smtClean="0"/>
-              <a:t>5/6/2020</a:t>
+              <a:t>5/12/2020</a:t>
             </a:fld>
             <a:endParaRPr lang="en-US"/>
           </a:p>
@@ -880,7 +880,7 @@
           <a:p>
             <a:fld id="{477E4798-8B83-41D6-B8E2-2E5E8090BEC2}" type="datetimeFigureOut">
               <a:rPr lang="en-US" smtClean="0"/>
-              <a:t>5/6/2020</a:t>
+              <a:t>5/12/2020</a:t>
             </a:fld>
             <a:endParaRPr lang="en-US"/>
           </a:p>
@@ -1155,7 +1155,7 @@
           <a:p>
             <a:fld id="{477E4798-8B83-41D6-B8E2-2E5E8090BEC2}" type="datetimeFigureOut">
               <a:rPr lang="en-US" smtClean="0"/>
-              <a:t>5/6/2020</a:t>
+              <a:t>5/12/2020</a:t>
             </a:fld>
             <a:endParaRPr lang="en-US"/>
           </a:p>
@@ -1420,7 +1420,7 @@
           <a:p>
             <a:fld id="{477E4798-8B83-41D6-B8E2-2E5E8090BEC2}" type="datetimeFigureOut">
               <a:rPr lang="en-US" smtClean="0"/>
-              <a:t>5/6/2020</a:t>
+              <a:t>5/12/2020</a:t>
             </a:fld>
             <a:endParaRPr lang="en-US"/>
           </a:p>
@@ -1832,7 +1832,7 @@
           <a:p>
             <a:fld id="{477E4798-8B83-41D6-B8E2-2E5E8090BEC2}" type="datetimeFigureOut">
               <a:rPr lang="en-US" smtClean="0"/>
-              <a:t>5/6/2020</a:t>
+              <a:t>5/12/2020</a:t>
             </a:fld>
             <a:endParaRPr lang="en-US"/>
           </a:p>
@@ -1973,7 +1973,7 @@
           <a:p>
             <a:fld id="{477E4798-8B83-41D6-B8E2-2E5E8090BEC2}" type="datetimeFigureOut">
               <a:rPr lang="en-US" smtClean="0"/>
-              <a:t>5/6/2020</a:t>
+              <a:t>5/12/2020</a:t>
             </a:fld>
             <a:endParaRPr lang="en-US"/>
           </a:p>
@@ -2086,7 +2086,7 @@
           <a:p>
             <a:fld id="{477E4798-8B83-41D6-B8E2-2E5E8090BEC2}" type="datetimeFigureOut">
               <a:rPr lang="en-US" smtClean="0"/>
-              <a:t>5/6/2020</a:t>
+              <a:t>5/12/2020</a:t>
             </a:fld>
             <a:endParaRPr lang="en-US"/>
           </a:p>
@@ -2397,7 +2397,7 @@
           <a:p>
             <a:fld id="{477E4798-8B83-41D6-B8E2-2E5E8090BEC2}" type="datetimeFigureOut">
               <a:rPr lang="en-US" smtClean="0"/>
-              <a:t>5/6/2020</a:t>
+              <a:t>5/12/2020</a:t>
             </a:fld>
             <a:endParaRPr lang="en-US"/>
           </a:p>
@@ -2685,7 +2685,7 @@
           <a:p>
             <a:fld id="{477E4798-8B83-41D6-B8E2-2E5E8090BEC2}" type="datetimeFigureOut">
               <a:rPr lang="en-US" smtClean="0"/>
-              <a:t>5/6/2020</a:t>
+              <a:t>5/12/2020</a:t>
             </a:fld>
             <a:endParaRPr lang="en-US"/>
           </a:p>
@@ -2926,7 +2926,7 @@
           <a:p>
             <a:fld id="{477E4798-8B83-41D6-B8E2-2E5E8090BEC2}" type="datetimeFigureOut">
               <a:rPr lang="en-US" smtClean="0"/>
-              <a:t>5/6/2020</a:t>
+              <a:t>5/12/2020</a:t>
             </a:fld>
             <a:endParaRPr lang="en-US"/>
           </a:p>
@@ -6158,8 +6158,8 @@
         </p:nvSpPr>
         <p:spPr>
           <a:xfrm>
-            <a:off x="0" y="0"/>
-            <a:ext cx="12192000" cy="4401205"/>
+            <a:off x="-676849" y="415871"/>
+            <a:ext cx="13545697" cy="3785652"/>
           </a:xfrm>
           <a:prstGeom prst="rect">
             <a:avLst/>
@@ -6174,7 +6174,7 @@
           <a:p>
             <a:pPr algn="ctr"/>
             <a:r>
-              <a:rPr lang="en-US" sz="7000" b="0" cap="none" spc="0" dirty="0">
+              <a:rPr lang="en-US" sz="12000" b="0" cap="none" spc="0" dirty="0">
                 <a:ln w="0"/>
                 <a:solidFill>
                   <a:schemeClr val="tx1"/>
@@ -6187,7 +6187,7 @@
                   </a:outerShdw>
                 </a:effectLst>
               </a:rPr>
-              <a:t>Place hand over top of robot every time it stops. See how many time times you can do this before the timer runs out</a:t>
+              <a:t>Place hand over robot when it stops</a:t>
             </a:r>
           </a:p>
         </p:txBody>

</xml_diff>